<commit_message>
update data & ppt
</commit_message>
<xml_diff>
--- a/doc/CNN on Text.pptx
+++ b/doc/CNN on Text.pptx
@@ -9,6 +9,8 @@
     <p:sldId id="259" r:id="rId3"/>
     <p:sldId id="257" r:id="rId4"/>
     <p:sldId id="258" r:id="rId5"/>
+    <p:sldId id="260" r:id="rId6"/>
+    <p:sldId id="261" r:id="rId7"/>
   </p:sldIdLst>
   <p:sldSz cx="9144000" cy="6858000" type="screen4x3"/>
   <p:notesSz cx="6858000" cy="9144000"/>
@@ -107,6 +109,22 @@
       </a:defRPr>
     </a:lvl9pPr>
   </p:defaultTextStyle>
+  <p:extLst>
+    <p:ext uri="{EFAFB233-063F-42B5-8137-9DF3F51BA10A}">
+      <p15:sldGuideLst xmlns:p15="http://schemas.microsoft.com/office/powerpoint/2012/main">
+        <p15:guide id="1" orient="horz" pos="2160">
+          <p15:clr>
+            <a:srgbClr val="A4A3A4"/>
+          </p15:clr>
+        </p15:guide>
+        <p15:guide id="2" pos="2880">
+          <p15:clr>
+            <a:srgbClr val="A4A3A4"/>
+          </p15:clr>
+        </p15:guide>
+      </p15:sldGuideLst>
+    </p:ext>
+  </p:extLst>
 </p:presentation>
 </file>
 
@@ -291,7 +309,7 @@
           <a:p>
             <a:fld id="{66DEC56F-BCBC-40FA-AA23-DE3A6F544FBE}" type="datetimeFigureOut">
               <a:rPr lang="zh-CN" altLang="en-US" smtClean="0"/>
-              <a:t>2014/11/2</a:t>
+              <a:t>2014/11/3</a:t>
             </a:fld>
             <a:endParaRPr lang="zh-CN" altLang="en-US"/>
           </a:p>
@@ -456,7 +474,7 @@
           <a:p>
             <a:fld id="{66DEC56F-BCBC-40FA-AA23-DE3A6F544FBE}" type="datetimeFigureOut">
               <a:rPr lang="zh-CN" altLang="en-US" smtClean="0"/>
-              <a:t>2014/11/2</a:t>
+              <a:t>2014/11/3</a:t>
             </a:fld>
             <a:endParaRPr lang="zh-CN" altLang="en-US"/>
           </a:p>
@@ -631,7 +649,7 @@
           <a:p>
             <a:fld id="{66DEC56F-BCBC-40FA-AA23-DE3A6F544FBE}" type="datetimeFigureOut">
               <a:rPr lang="zh-CN" altLang="en-US" smtClean="0"/>
-              <a:t>2014/11/2</a:t>
+              <a:t>2014/11/3</a:t>
             </a:fld>
             <a:endParaRPr lang="zh-CN" altLang="en-US"/>
           </a:p>
@@ -796,7 +814,7 @@
           <a:p>
             <a:fld id="{66DEC56F-BCBC-40FA-AA23-DE3A6F544FBE}" type="datetimeFigureOut">
               <a:rPr lang="zh-CN" altLang="en-US" smtClean="0"/>
-              <a:t>2014/11/2</a:t>
+              <a:t>2014/11/3</a:t>
             </a:fld>
             <a:endParaRPr lang="zh-CN" altLang="en-US"/>
           </a:p>
@@ -1037,7 +1055,7 @@
           <a:p>
             <a:fld id="{66DEC56F-BCBC-40FA-AA23-DE3A6F544FBE}" type="datetimeFigureOut">
               <a:rPr lang="zh-CN" altLang="en-US" smtClean="0"/>
-              <a:t>2014/11/2</a:t>
+              <a:t>2014/11/3</a:t>
             </a:fld>
             <a:endParaRPr lang="zh-CN" altLang="en-US"/>
           </a:p>
@@ -1320,7 +1338,7 @@
           <a:p>
             <a:fld id="{66DEC56F-BCBC-40FA-AA23-DE3A6F544FBE}" type="datetimeFigureOut">
               <a:rPr lang="zh-CN" altLang="en-US" smtClean="0"/>
-              <a:t>2014/11/2</a:t>
+              <a:t>2014/11/3</a:t>
             </a:fld>
             <a:endParaRPr lang="zh-CN" altLang="en-US"/>
           </a:p>
@@ -1737,7 +1755,7 @@
           <a:p>
             <a:fld id="{66DEC56F-BCBC-40FA-AA23-DE3A6F544FBE}" type="datetimeFigureOut">
               <a:rPr lang="zh-CN" altLang="en-US" smtClean="0"/>
-              <a:t>2014/11/2</a:t>
+              <a:t>2014/11/3</a:t>
             </a:fld>
             <a:endParaRPr lang="zh-CN" altLang="en-US"/>
           </a:p>
@@ -1850,7 +1868,7 @@
           <a:p>
             <a:fld id="{66DEC56F-BCBC-40FA-AA23-DE3A6F544FBE}" type="datetimeFigureOut">
               <a:rPr lang="zh-CN" altLang="en-US" smtClean="0"/>
-              <a:t>2014/11/2</a:t>
+              <a:t>2014/11/3</a:t>
             </a:fld>
             <a:endParaRPr lang="zh-CN" altLang="en-US"/>
           </a:p>
@@ -1940,7 +1958,7 @@
           <a:p>
             <a:fld id="{66DEC56F-BCBC-40FA-AA23-DE3A6F544FBE}" type="datetimeFigureOut">
               <a:rPr lang="zh-CN" altLang="en-US" smtClean="0"/>
-              <a:t>2014/11/2</a:t>
+              <a:t>2014/11/3</a:t>
             </a:fld>
             <a:endParaRPr lang="zh-CN" altLang="en-US"/>
           </a:p>
@@ -2212,7 +2230,7 @@
           <a:p>
             <a:fld id="{66DEC56F-BCBC-40FA-AA23-DE3A6F544FBE}" type="datetimeFigureOut">
               <a:rPr lang="zh-CN" altLang="en-US" smtClean="0"/>
-              <a:t>2014/11/2</a:t>
+              <a:t>2014/11/3</a:t>
             </a:fld>
             <a:endParaRPr lang="zh-CN" altLang="en-US"/>
           </a:p>
@@ -2460,7 +2478,7 @@
           <a:p>
             <a:fld id="{66DEC56F-BCBC-40FA-AA23-DE3A6F544FBE}" type="datetimeFigureOut">
               <a:rPr lang="zh-CN" altLang="en-US" smtClean="0"/>
-              <a:t>2014/11/2</a:t>
+              <a:t>2014/11/3</a:t>
             </a:fld>
             <a:endParaRPr lang="zh-CN" altLang="en-US"/>
           </a:p>
@@ -2668,7 +2686,7 @@
           <a:p>
             <a:fld id="{66DEC56F-BCBC-40FA-AA23-DE3A6F544FBE}" type="datetimeFigureOut">
               <a:rPr lang="zh-CN" altLang="en-US" smtClean="0"/>
-              <a:t>2014/11/2</a:t>
+              <a:t>2014/11/3</a:t>
             </a:fld>
             <a:endParaRPr lang="zh-CN" altLang="en-US"/>
           </a:p>
@@ -3339,23 +3357,7 @@
           <a:p>
             <a:r>
               <a:rPr lang="en-US" altLang="zh-CN" dirty="0" smtClean="0"/>
-              <a:t>A </a:t>
-            </a:r>
-            <a:r>
-              <a:rPr lang="en-US" altLang="zh-CN" dirty="0" err="1" smtClean="0"/>
-              <a:t>Convolutional</a:t>
-            </a:r>
-            <a:r>
-              <a:rPr lang="en-US" altLang="zh-CN" dirty="0" smtClean="0"/>
-              <a:t> Neural Network for </a:t>
-            </a:r>
-            <a:r>
-              <a:rPr lang="en-US" altLang="zh-CN" dirty="0" err="1" smtClean="0"/>
-              <a:t>Modelling</a:t>
-            </a:r>
-            <a:r>
-              <a:rPr lang="en-US" altLang="zh-CN" dirty="0" smtClean="0"/>
-              <a:t> Sentences</a:t>
+              <a:t>A Convolutional Neural Network for Modelling Sentences</a:t>
             </a:r>
             <a:endParaRPr lang="zh-CN" altLang="en-US" dirty="0"/>
           </a:p>
@@ -3404,42 +3406,140 @@
           <a:lstStyle/>
           <a:p>
             <a:r>
-              <a:rPr lang="en-US" altLang="zh-CN" dirty="0" err="1" smtClean="0"/>
-              <a:t>Modelling</a:t>
-            </a:r>
-            <a:r>
               <a:rPr lang="en-US" altLang="zh-CN" dirty="0" smtClean="0"/>
-              <a:t>, </a:t>
-            </a:r>
-            <a:r>
-              <a:rPr lang="en-US" altLang="zh-CN" dirty="0" err="1" smtClean="0"/>
-              <a:t>Visualising</a:t>
+              <a:t>Modelling, </a:t>
             </a:r>
             <a:r>
               <a:rPr lang="en-US" altLang="zh-CN" dirty="0" smtClean="0"/>
-              <a:t> and </a:t>
-            </a:r>
-            <a:r>
-              <a:rPr lang="en-US" altLang="zh-CN" dirty="0" err="1" smtClean="0"/>
-              <a:t>Summarising</a:t>
+              <a:t>Visualizing </a:t>
             </a:r>
             <a:r>
               <a:rPr lang="en-US" altLang="zh-CN" dirty="0" smtClean="0"/>
-              <a:t> Documents with a Single </a:t>
-            </a:r>
-            <a:r>
-              <a:rPr lang="en-US" altLang="zh-CN" dirty="0" err="1" smtClean="0"/>
-              <a:t>Convolutional</a:t>
+              <a:t>and </a:t>
             </a:r>
             <a:r>
               <a:rPr lang="en-US" altLang="zh-CN" dirty="0" smtClean="0"/>
-              <a:t> Neural Network</a:t>
+              <a:t>Summarizing </a:t>
+            </a:r>
+            <a:r>
+              <a:rPr lang="en-US" altLang="zh-CN" dirty="0" smtClean="0"/>
+              <a:t>Documents with a Single Convolutional Neural Network</a:t>
             </a:r>
             <a:endParaRPr lang="zh-CN" altLang="en-US" dirty="0"/>
           </a:p>
         </p:txBody>
       </p:sp>
     </p:spTree>
+  </p:cSld>
+  <p:clrMapOvr>
+    <a:masterClrMapping/>
+  </p:clrMapOvr>
+</p:sld>
+</file>
+
+<file path=ppt/slides/slide5.xml><?xml version="1.0" encoding="utf-8"?>
+<p:sld xmlns:a="http://schemas.openxmlformats.org/drawingml/2006/main" xmlns:r="http://schemas.openxmlformats.org/officeDocument/2006/relationships" xmlns:p="http://schemas.openxmlformats.org/presentationml/2006/main">
+  <p:cSld>
+    <p:spTree>
+      <p:nvGrpSpPr>
+        <p:cNvPr id="1" name=""/>
+        <p:cNvGrpSpPr/>
+        <p:nvPr/>
+      </p:nvGrpSpPr>
+      <p:grpSpPr>
+        <a:xfrm>
+          <a:off x="0" y="0"/>
+          <a:ext cx="0" cy="0"/>
+          <a:chOff x="0" y="0"/>
+          <a:chExt cx="0" cy="0"/>
+        </a:xfrm>
+      </p:grpSpPr>
+      <p:sp>
+        <p:nvSpPr>
+          <p:cNvPr id="2" name="标题 1"/>
+          <p:cNvSpPr>
+            <a:spLocks noGrp="1"/>
+          </p:cNvSpPr>
+          <p:nvPr>
+            <p:ph type="title"/>
+          </p:nvPr>
+        </p:nvSpPr>
+        <p:spPr/>
+        <p:txBody>
+          <a:bodyPr>
+            <a:normAutofit fontScale="90000"/>
+          </a:bodyPr>
+          <a:lstStyle/>
+          <a:p>
+            <a:r>
+              <a:rPr lang="en-US" altLang="zh-CN" dirty="0" smtClean="0"/>
+              <a:t>Convolutional Neural Network Architecture for Matching Natural Language Sentences </a:t>
+            </a:r>
+            <a:endParaRPr lang="zh-CN" altLang="en-US" dirty="0"/>
+          </a:p>
+        </p:txBody>
+      </p:sp>
+    </p:spTree>
+    <p:extLst>
+      <p:ext uri="{BB962C8B-B14F-4D97-AF65-F5344CB8AC3E}">
+        <p14:creationId xmlns:p14="http://schemas.microsoft.com/office/powerpoint/2010/main" val="2470634940"/>
+      </p:ext>
+    </p:extLst>
+  </p:cSld>
+  <p:clrMapOvr>
+    <a:masterClrMapping/>
+  </p:clrMapOvr>
+</p:sld>
+</file>
+
+<file path=ppt/slides/slide6.xml><?xml version="1.0" encoding="utf-8"?>
+<p:sld xmlns:a="http://schemas.openxmlformats.org/drawingml/2006/main" xmlns:r="http://schemas.openxmlformats.org/officeDocument/2006/relationships" xmlns:p="http://schemas.openxmlformats.org/presentationml/2006/main">
+  <p:cSld>
+    <p:spTree>
+      <p:nvGrpSpPr>
+        <p:cNvPr id="1" name=""/>
+        <p:cNvGrpSpPr/>
+        <p:nvPr/>
+      </p:nvGrpSpPr>
+      <p:grpSpPr>
+        <a:xfrm>
+          <a:off x="0" y="0"/>
+          <a:ext cx="0" cy="0"/>
+          <a:chOff x="0" y="0"/>
+          <a:chExt cx="0" cy="0"/>
+        </a:xfrm>
+      </p:grpSpPr>
+      <p:sp>
+        <p:nvSpPr>
+          <p:cNvPr id="2" name="标题 1"/>
+          <p:cNvSpPr>
+            <a:spLocks noGrp="1"/>
+          </p:cNvSpPr>
+          <p:nvPr>
+            <p:ph type="title"/>
+          </p:nvPr>
+        </p:nvSpPr>
+        <p:spPr/>
+        <p:txBody>
+          <a:bodyPr>
+            <a:normAutofit fontScale="90000"/>
+          </a:bodyPr>
+          <a:lstStyle/>
+          <a:p>
+            <a:r>
+              <a:rPr lang="en-US" altLang="zh-CN" dirty="0" smtClean="0"/>
+              <a:t>A Latent Semantic Model with Convolutional-pooling Structure for Information Retrieval</a:t>
+            </a:r>
+            <a:endParaRPr lang="zh-CN" altLang="en-US" dirty="0"/>
+          </a:p>
+        </p:txBody>
+      </p:sp>
+    </p:spTree>
+    <p:extLst>
+      <p:ext uri="{BB962C8B-B14F-4D97-AF65-F5344CB8AC3E}">
+        <p14:creationId xmlns:p14="http://schemas.microsoft.com/office/powerpoint/2010/main" val="2353684115"/>
+      </p:ext>
+    </p:extLst>
   </p:cSld>
   <p:clrMapOvr>
     <a:masterClrMapping/>
@@ -3455,7 +3555,7 @@
         <a:sysClr val="windowText" lastClr="000000"/>
       </a:dk1>
       <a:lt1>
-        <a:sysClr val="window" lastClr="C7EDCC"/>
+        <a:sysClr val="window" lastClr="FFFFFF"/>
       </a:lt1>
       <a:dk2>
         <a:srgbClr val="1F497D"/>

</xml_diff>